<commit_message>
slide of Schedual is updated
</commit_message>
<xml_diff>
--- a/ExampleinOilIndustry/Schedual.pptx
+++ b/ExampleinOilIndustry/Schedual.pptx
@@ -5,9 +5,7 @@
     <p:sldMasterId id="2147483648" r:id="rId1"/>
   </p:sldMasterIdLst>
   <p:sldIdLst>
-    <p:sldId id="256" r:id="rId2"/>
-    <p:sldId id="258" r:id="rId3"/>
-    <p:sldId id="257" r:id="rId4"/>
+    <p:sldId id="258" r:id="rId2"/>
   </p:sldIdLst>
   <p:sldSz cx="12192000" cy="6858000"/>
   <p:notesSz cx="6858000" cy="9144000"/>
@@ -106,6 +104,11 @@
       </a:defRPr>
     </a:lvl9pPr>
   </p:defaultTextStyle>
+  <p:extLst>
+    <p:ext uri="{EFAFB233-063F-42B5-8137-9DF3F51BA10A}">
+      <p15:sldGuideLst xmlns:p15="http://schemas.microsoft.com/office/powerpoint/2012/main"/>
+    </p:ext>
+  </p:extLst>
 </p:presentation>
 </file>
 
@@ -3323,86 +3326,6 @@
           <a:chExt cx="0" cy="0"/>
         </a:xfrm>
       </p:grpSpPr>
-      <p:sp>
-        <p:nvSpPr>
-          <p:cNvPr id="2" name="Title 1">
-            <a:extLst>
-              <a:ext uri="{FF2B5EF4-FFF2-40B4-BE49-F238E27FC236}">
-                <a16:creationId xmlns:a16="http://schemas.microsoft.com/office/drawing/2014/main" id="{CF72E136-86EB-4912-8A2F-50112793DBC5}"/>
-              </a:ext>
-            </a:extLst>
-          </p:cNvPr>
-          <p:cNvSpPr>
-            <a:spLocks noGrp="1"/>
-          </p:cNvSpPr>
-          <p:nvPr>
-            <p:ph type="ctrTitle"/>
-          </p:nvPr>
-        </p:nvSpPr>
-        <p:spPr/>
-        <p:txBody>
-          <a:bodyPr/>
-          <a:lstStyle/>
-          <a:p>
-            <a:endParaRPr lang="en-US"/>
-          </a:p>
-        </p:txBody>
-      </p:sp>
-      <p:sp>
-        <p:nvSpPr>
-          <p:cNvPr id="3" name="Subtitle 2">
-            <a:extLst>
-              <a:ext uri="{FF2B5EF4-FFF2-40B4-BE49-F238E27FC236}">
-                <a16:creationId xmlns:a16="http://schemas.microsoft.com/office/drawing/2014/main" id="{FC078A08-F32D-42A8-AFA0-D8A1529349CC}"/>
-              </a:ext>
-            </a:extLst>
-          </p:cNvPr>
-          <p:cNvSpPr>
-            <a:spLocks noGrp="1"/>
-          </p:cNvSpPr>
-          <p:nvPr>
-            <p:ph type="subTitle" idx="1"/>
-          </p:nvPr>
-        </p:nvSpPr>
-        <p:spPr/>
-        <p:txBody>
-          <a:bodyPr/>
-          <a:lstStyle/>
-          <a:p>
-            <a:endParaRPr lang="en-US"/>
-          </a:p>
-        </p:txBody>
-      </p:sp>
-    </p:spTree>
-    <p:extLst>
-      <p:ext uri="{BB962C8B-B14F-4D97-AF65-F5344CB8AC3E}">
-        <p14:creationId xmlns:p14="http://schemas.microsoft.com/office/powerpoint/2010/main" val="774310757"/>
-      </p:ext>
-    </p:extLst>
-  </p:cSld>
-  <p:clrMapOvr>
-    <a:masterClrMapping/>
-  </p:clrMapOvr>
-</p:sld>
-</file>
-
-<file path=ppt/slides/slide2.xml><?xml version="1.0" encoding="utf-8"?>
-<p:sld xmlns:a="http://schemas.openxmlformats.org/drawingml/2006/main" xmlns:r="http://schemas.openxmlformats.org/officeDocument/2006/relationships" xmlns:p="http://schemas.openxmlformats.org/presentationml/2006/main">
-  <p:cSld>
-    <p:spTree>
-      <p:nvGrpSpPr>
-        <p:cNvPr id="1" name=""/>
-        <p:cNvGrpSpPr/>
-        <p:nvPr/>
-      </p:nvGrpSpPr>
-      <p:grpSpPr>
-        <a:xfrm>
-          <a:off x="0" y="0"/>
-          <a:ext cx="0" cy="0"/>
-          <a:chOff x="0" y="0"/>
-          <a:chExt cx="0" cy="0"/>
-        </a:xfrm>
-      </p:grpSpPr>
       <p:pic>
         <p:nvPicPr>
           <p:cNvPr id="2" name="Picture 1">
@@ -3496,2019 +3419,6 @@
     <p:extLst>
       <p:ext uri="{BB962C8B-B14F-4D97-AF65-F5344CB8AC3E}">
         <p14:creationId xmlns:p14="http://schemas.microsoft.com/office/powerpoint/2010/main" val="2666025821"/>
-      </p:ext>
-    </p:extLst>
-  </p:cSld>
-  <p:clrMapOvr>
-    <a:masterClrMapping/>
-  </p:clrMapOvr>
-</p:sld>
-</file>
-
-<file path=ppt/slides/slide3.xml><?xml version="1.0" encoding="utf-8"?>
-<p:sld xmlns:a="http://schemas.openxmlformats.org/drawingml/2006/main" xmlns:r="http://schemas.openxmlformats.org/officeDocument/2006/relationships" xmlns:p="http://schemas.openxmlformats.org/presentationml/2006/main">
-  <p:cSld>
-    <p:spTree>
-      <p:nvGrpSpPr>
-        <p:cNvPr id="1" name=""/>
-        <p:cNvGrpSpPr/>
-        <p:nvPr/>
-      </p:nvGrpSpPr>
-      <p:grpSpPr>
-        <a:xfrm>
-          <a:off x="0" y="0"/>
-          <a:ext cx="0" cy="0"/>
-          <a:chOff x="0" y="0"/>
-          <a:chExt cx="0" cy="0"/>
-        </a:xfrm>
-      </p:grpSpPr>
-      <p:sp>
-        <p:nvSpPr>
-          <p:cNvPr id="85" name="Text Box 2">
-            <a:extLst>
-              <a:ext uri="{FF2B5EF4-FFF2-40B4-BE49-F238E27FC236}">
-                <a16:creationId xmlns:a16="http://schemas.microsoft.com/office/drawing/2014/main" id="{B954653B-BDD6-4C7F-B097-C6ABFC848868}"/>
-              </a:ext>
-            </a:extLst>
-          </p:cNvPr>
-          <p:cNvSpPr txBox="1">
-            <a:spLocks noChangeArrowheads="1"/>
-          </p:cNvSpPr>
-          <p:nvPr/>
-        </p:nvSpPr>
-        <p:spPr bwMode="auto">
-          <a:xfrm>
-            <a:off x="8604791" y="3242074"/>
-            <a:ext cx="1792605" cy="419100"/>
-          </a:xfrm>
-          <a:prstGeom prst="rect">
-            <a:avLst/>
-          </a:prstGeom>
-          <a:solidFill>
-            <a:srgbClr val="FFFFFF"/>
-          </a:solidFill>
-          <a:ln w="9525">
-            <a:noFill/>
-            <a:miter lim="800000"/>
-            <a:headEnd/>
-            <a:tailEnd/>
-          </a:ln>
-        </p:spPr>
-        <p:txBody>
-          <a:bodyPr rot="0" vert="horz" wrap="square" lIns="91440" tIns="45720" rIns="91440" bIns="45720" anchor="t" anchorCtr="0">
-            <a:noAutofit/>
-          </a:bodyPr>
-          <a:lstStyle/>
-          <a:p>
-            <a:pPr marL="0" marR="0">
-              <a:lnSpc>
-                <a:spcPct val="107000"/>
-              </a:lnSpc>
-              <a:spcBef>
-                <a:spcPts val="0"/>
-              </a:spcBef>
-              <a:spcAft>
-                <a:spcPts val="800"/>
-              </a:spcAft>
-            </a:pPr>
-            <a:r>
-              <a:rPr lang="en-US" sz="1100" dirty="0">
-                <a:effectLst/>
-                <a:latin typeface="Calibri" panose="020F0502020204030204" pitchFamily="34" charset="0"/>
-                <a:ea typeface="Calibri" panose="020F0502020204030204" pitchFamily="34" charset="0"/>
-                <a:cs typeface="Times New Roman" panose="02020603050405020304" pitchFamily="18" charset="0"/>
-              </a:rPr>
-              <a:t>Normal pressure</a:t>
-            </a:r>
-          </a:p>
-        </p:txBody>
-      </p:sp>
-      <p:sp>
-        <p:nvSpPr>
-          <p:cNvPr id="84" name="Text Box 2">
-            <a:extLst>
-              <a:ext uri="{FF2B5EF4-FFF2-40B4-BE49-F238E27FC236}">
-                <a16:creationId xmlns:a16="http://schemas.microsoft.com/office/drawing/2014/main" id="{3681CF14-21C1-4F71-81B2-C769B3DB18A7}"/>
-              </a:ext>
-            </a:extLst>
-          </p:cNvPr>
-          <p:cNvSpPr txBox="1">
-            <a:spLocks noChangeArrowheads="1"/>
-          </p:cNvSpPr>
-          <p:nvPr/>
-        </p:nvSpPr>
-        <p:spPr bwMode="auto">
-          <a:xfrm>
-            <a:off x="8436873" y="4702517"/>
-            <a:ext cx="1792605" cy="419100"/>
-          </a:xfrm>
-          <a:prstGeom prst="rect">
-            <a:avLst/>
-          </a:prstGeom>
-          <a:solidFill>
-            <a:srgbClr val="FFFFFF"/>
-          </a:solidFill>
-          <a:ln w="9525">
-            <a:noFill/>
-            <a:miter lim="800000"/>
-            <a:headEnd/>
-            <a:tailEnd/>
-          </a:ln>
-        </p:spPr>
-        <p:txBody>
-          <a:bodyPr rot="0" vert="horz" wrap="square" lIns="91440" tIns="45720" rIns="91440" bIns="45720" anchor="t" anchorCtr="0">
-            <a:noAutofit/>
-          </a:bodyPr>
-          <a:lstStyle/>
-          <a:p>
-            <a:pPr marL="0" marR="0">
-              <a:lnSpc>
-                <a:spcPct val="107000"/>
-              </a:lnSpc>
-              <a:spcBef>
-                <a:spcPts val="0"/>
-              </a:spcBef>
-              <a:spcAft>
-                <a:spcPts val="800"/>
-              </a:spcAft>
-            </a:pPr>
-            <a:r>
-              <a:rPr lang="en-US" sz="1100" dirty="0">
-                <a:effectLst/>
-                <a:latin typeface="Calibri" panose="020F0502020204030204" pitchFamily="34" charset="0"/>
-                <a:ea typeface="Calibri" panose="020F0502020204030204" pitchFamily="34" charset="0"/>
-                <a:cs typeface="Times New Roman" panose="02020603050405020304" pitchFamily="18" charset="0"/>
-              </a:rPr>
-              <a:t>Abnormal pressure</a:t>
-            </a:r>
-          </a:p>
-        </p:txBody>
-      </p:sp>
-      <p:sp>
-        <p:nvSpPr>
-          <p:cNvPr id="83" name="Text Box 2">
-            <a:extLst>
-              <a:ext uri="{FF2B5EF4-FFF2-40B4-BE49-F238E27FC236}">
-                <a16:creationId xmlns:a16="http://schemas.microsoft.com/office/drawing/2014/main" id="{EC56F929-521A-4BC2-813D-0547777ED228}"/>
-              </a:ext>
-            </a:extLst>
-          </p:cNvPr>
-          <p:cNvSpPr txBox="1">
-            <a:spLocks noChangeArrowheads="1"/>
-          </p:cNvSpPr>
-          <p:nvPr/>
-        </p:nvSpPr>
-        <p:spPr bwMode="auto">
-          <a:xfrm>
-            <a:off x="10351547" y="2747012"/>
-            <a:ext cx="1792605" cy="419100"/>
-          </a:xfrm>
-          <a:prstGeom prst="rect">
-            <a:avLst/>
-          </a:prstGeom>
-          <a:solidFill>
-            <a:srgbClr val="FFFFFF"/>
-          </a:solidFill>
-          <a:ln w="9525">
-            <a:noFill/>
-            <a:miter lim="800000"/>
-            <a:headEnd/>
-            <a:tailEnd/>
-          </a:ln>
-        </p:spPr>
-        <p:txBody>
-          <a:bodyPr rot="0" vert="horz" wrap="square" lIns="91440" tIns="45720" rIns="91440" bIns="45720" anchor="t" anchorCtr="0">
-            <a:noAutofit/>
-          </a:bodyPr>
-          <a:lstStyle/>
-          <a:p>
-            <a:pPr marL="0" marR="0">
-              <a:lnSpc>
-                <a:spcPct val="107000"/>
-              </a:lnSpc>
-              <a:spcBef>
-                <a:spcPts val="0"/>
-              </a:spcBef>
-              <a:spcAft>
-                <a:spcPts val="800"/>
-              </a:spcAft>
-            </a:pPr>
-            <a:r>
-              <a:rPr lang="en-US" sz="1100" dirty="0">
-                <a:effectLst/>
-                <a:latin typeface="Calibri" panose="020F0502020204030204" pitchFamily="34" charset="0"/>
-                <a:ea typeface="Calibri" panose="020F0502020204030204" pitchFamily="34" charset="0"/>
-                <a:cs typeface="Times New Roman" panose="02020603050405020304" pitchFamily="18" charset="0"/>
-              </a:rPr>
-              <a:t>Normal pressure</a:t>
-            </a:r>
-          </a:p>
-        </p:txBody>
-      </p:sp>
-      <p:sp>
-        <p:nvSpPr>
-          <p:cNvPr id="4" name="Rectangle 3">
-            <a:extLst>
-              <a:ext uri="{FF2B5EF4-FFF2-40B4-BE49-F238E27FC236}">
-                <a16:creationId xmlns:a16="http://schemas.microsoft.com/office/drawing/2014/main" id="{F1E2D2DC-8573-4CC5-BBF8-12BA8B120241}"/>
-              </a:ext>
-            </a:extLst>
-          </p:cNvPr>
-          <p:cNvSpPr/>
-          <p:nvPr/>
-        </p:nvSpPr>
-        <p:spPr>
-          <a:xfrm>
-            <a:off x="1848618" y="2423205"/>
-            <a:ext cx="1575707" cy="817572"/>
-          </a:xfrm>
-          <a:prstGeom prst="rect">
-            <a:avLst/>
-          </a:prstGeom>
-          <a:noFill/>
-          <a:ln>
-            <a:solidFill>
-              <a:schemeClr val="tx1"/>
-            </a:solidFill>
-          </a:ln>
-        </p:spPr>
-        <p:style>
-          <a:lnRef idx="2">
-            <a:schemeClr val="accent1">
-              <a:shade val="50000"/>
-            </a:schemeClr>
-          </a:lnRef>
-          <a:fillRef idx="1">
-            <a:schemeClr val="accent1"/>
-          </a:fillRef>
-          <a:effectRef idx="0">
-            <a:schemeClr val="accent1"/>
-          </a:effectRef>
-          <a:fontRef idx="minor">
-            <a:schemeClr val="lt1"/>
-          </a:fontRef>
-        </p:style>
-        <p:txBody>
-          <a:bodyPr rtlCol="0" anchor="ctr"/>
-          <a:lstStyle/>
-          <a:p>
-            <a:pPr algn="ctr"/>
-            <a:r>
-              <a:rPr lang="en-US" sz="1400" dirty="0">
-                <a:solidFill>
-                  <a:schemeClr val="tx1"/>
-                </a:solidFill>
-              </a:rPr>
-              <a:t>2)Flow rate measurements from sensors</a:t>
-            </a:r>
-          </a:p>
-          <a:p>
-            <a:pPr algn="ctr"/>
-            <a:r>
-              <a:rPr lang="en-US" sz="1400" dirty="0">
-                <a:solidFill>
-                  <a:srgbClr val="7030A0"/>
-                </a:solidFill>
-              </a:rPr>
-              <a:t>-write #m5</a:t>
-            </a:r>
-          </a:p>
-        </p:txBody>
-      </p:sp>
-      <p:sp>
-        <p:nvSpPr>
-          <p:cNvPr id="7" name="Rectangle 6">
-            <a:extLst>
-              <a:ext uri="{FF2B5EF4-FFF2-40B4-BE49-F238E27FC236}">
-                <a16:creationId xmlns:a16="http://schemas.microsoft.com/office/drawing/2014/main" id="{0369E625-FE7A-42BE-8388-F4AFF34B9212}"/>
-              </a:ext>
-            </a:extLst>
-          </p:cNvPr>
-          <p:cNvSpPr/>
-          <p:nvPr/>
-        </p:nvSpPr>
-        <p:spPr>
-          <a:xfrm>
-            <a:off x="2181418" y="4993383"/>
-            <a:ext cx="1476965" cy="914400"/>
-          </a:xfrm>
-          <a:prstGeom prst="rect">
-            <a:avLst/>
-          </a:prstGeom>
-          <a:noFill/>
-          <a:ln>
-            <a:solidFill>
-              <a:schemeClr val="tx1"/>
-            </a:solidFill>
-            <a:prstDash val="sysDot"/>
-          </a:ln>
-        </p:spPr>
-        <p:style>
-          <a:lnRef idx="2">
-            <a:schemeClr val="accent1">
-              <a:shade val="50000"/>
-            </a:schemeClr>
-          </a:lnRef>
-          <a:fillRef idx="1">
-            <a:schemeClr val="accent1"/>
-          </a:fillRef>
-          <a:effectRef idx="0">
-            <a:schemeClr val="accent1"/>
-          </a:effectRef>
-          <a:fontRef idx="minor">
-            <a:schemeClr val="lt1"/>
-          </a:fontRef>
-        </p:style>
-        <p:txBody>
-          <a:bodyPr rtlCol="0" anchor="ctr"/>
-          <a:lstStyle/>
-          <a:p>
-            <a:pPr algn="ctr"/>
-            <a:r>
-              <a:rPr lang="en-US" sz="1600" dirty="0">
-                <a:solidFill>
-                  <a:schemeClr val="tx1"/>
-                </a:solidFill>
-              </a:rPr>
-              <a:t>1)</a:t>
-            </a:r>
-            <a:r>
-              <a:rPr lang="en-US" sz="1400" dirty="0">
-                <a:solidFill>
-                  <a:schemeClr val="tx1"/>
-                </a:solidFill>
-              </a:rPr>
-              <a:t>Calculated flow rate</a:t>
-            </a:r>
-          </a:p>
-          <a:p>
-            <a:pPr algn="ctr"/>
-            <a:r>
-              <a:rPr lang="en-US" sz="1400" dirty="0">
-                <a:solidFill>
-                  <a:srgbClr val="7030A0"/>
-                </a:solidFill>
-              </a:rPr>
-              <a:t>-write into #m6 </a:t>
-            </a:r>
-          </a:p>
-        </p:txBody>
-      </p:sp>
-      <p:sp>
-        <p:nvSpPr>
-          <p:cNvPr id="9" name="Rectangle 8">
-            <a:extLst>
-              <a:ext uri="{FF2B5EF4-FFF2-40B4-BE49-F238E27FC236}">
-                <a16:creationId xmlns:a16="http://schemas.microsoft.com/office/drawing/2014/main" id="{52B5B3A3-BF3E-4D24-98C1-0DE298BBB6DC}"/>
-              </a:ext>
-            </a:extLst>
-          </p:cNvPr>
-          <p:cNvSpPr/>
-          <p:nvPr/>
-        </p:nvSpPr>
-        <p:spPr>
-          <a:xfrm>
-            <a:off x="4604659" y="2512472"/>
-            <a:ext cx="1268863" cy="1022460"/>
-          </a:xfrm>
-          <a:prstGeom prst="rect">
-            <a:avLst/>
-          </a:prstGeom>
-          <a:noFill/>
-          <a:ln>
-            <a:solidFill>
-              <a:schemeClr val="tx1"/>
-            </a:solidFill>
-          </a:ln>
-        </p:spPr>
-        <p:style>
-          <a:lnRef idx="2">
-            <a:schemeClr val="accent1">
-              <a:shade val="50000"/>
-            </a:schemeClr>
-          </a:lnRef>
-          <a:fillRef idx="1">
-            <a:schemeClr val="accent1"/>
-          </a:fillRef>
-          <a:effectRef idx="0">
-            <a:schemeClr val="accent1"/>
-          </a:effectRef>
-          <a:fontRef idx="minor">
-            <a:schemeClr val="lt1"/>
-          </a:fontRef>
-        </p:style>
-        <p:txBody>
-          <a:bodyPr rtlCol="0" anchor="ctr"/>
-          <a:lstStyle/>
-          <a:p>
-            <a:pPr algn="ctr"/>
-            <a:r>
-              <a:rPr lang="en-US" sz="1200" dirty="0">
-                <a:solidFill>
-                  <a:schemeClr val="tx1"/>
-                </a:solidFill>
-              </a:rPr>
-              <a:t>0)Initial pressure with uncertainty</a:t>
-            </a:r>
-          </a:p>
-          <a:p>
-            <a:pPr algn="ctr"/>
-            <a:r>
-              <a:rPr lang="en-US" sz="1200" dirty="0">
-                <a:solidFill>
-                  <a:schemeClr val="tx1"/>
-                </a:solidFill>
-              </a:rPr>
-              <a:t>-</a:t>
-            </a:r>
-            <a:r>
-              <a:rPr lang="en-US" sz="1200" dirty="0">
-                <a:solidFill>
-                  <a:srgbClr val="7030A0"/>
-                </a:solidFill>
-              </a:rPr>
-              <a:t>write #m10</a:t>
-            </a:r>
-          </a:p>
-        </p:txBody>
-      </p:sp>
-      <p:sp>
-        <p:nvSpPr>
-          <p:cNvPr id="11" name="Rectangle 10">
-            <a:extLst>
-              <a:ext uri="{FF2B5EF4-FFF2-40B4-BE49-F238E27FC236}">
-                <a16:creationId xmlns:a16="http://schemas.microsoft.com/office/drawing/2014/main" id="{CD31CBE4-FB2C-4DEB-B87E-B620CE2E1B61}"/>
-              </a:ext>
-            </a:extLst>
-          </p:cNvPr>
-          <p:cNvSpPr/>
-          <p:nvPr/>
-        </p:nvSpPr>
-        <p:spPr>
-          <a:xfrm>
-            <a:off x="4931907" y="4155621"/>
-            <a:ext cx="921885" cy="919201"/>
-          </a:xfrm>
-          <a:prstGeom prst="rect">
-            <a:avLst/>
-          </a:prstGeom>
-          <a:noFill/>
-          <a:ln>
-            <a:solidFill>
-              <a:schemeClr val="tx1"/>
-            </a:solidFill>
-          </a:ln>
-        </p:spPr>
-        <p:style>
-          <a:lnRef idx="2">
-            <a:schemeClr val="accent1">
-              <a:shade val="50000"/>
-            </a:schemeClr>
-          </a:lnRef>
-          <a:fillRef idx="1">
-            <a:schemeClr val="accent1"/>
-          </a:fillRef>
-          <a:effectRef idx="0">
-            <a:schemeClr val="accent1"/>
-          </a:effectRef>
-          <a:fontRef idx="minor">
-            <a:schemeClr val="lt1"/>
-          </a:fontRef>
-        </p:style>
-        <p:txBody>
-          <a:bodyPr rtlCol="0" anchor="ctr"/>
-          <a:lstStyle/>
-          <a:p>
-            <a:pPr algn="ctr"/>
-            <a:r>
-              <a:rPr lang="en-US" sz="1200" dirty="0">
-                <a:solidFill>
-                  <a:schemeClr val="tx1"/>
-                </a:solidFill>
-              </a:rPr>
-              <a:t>0&amp;4)Updated pressure</a:t>
-            </a:r>
-          </a:p>
-          <a:p>
-            <a:pPr algn="ctr"/>
-            <a:r>
-              <a:rPr lang="en-US" sz="1200" dirty="0">
-                <a:solidFill>
-                  <a:srgbClr val="7030A0"/>
-                </a:solidFill>
-              </a:rPr>
-              <a:t>-write into #m10</a:t>
-            </a:r>
-          </a:p>
-        </p:txBody>
-      </p:sp>
-      <p:sp>
-        <p:nvSpPr>
-          <p:cNvPr id="12" name="Oval 11">
-            <a:extLst>
-              <a:ext uri="{FF2B5EF4-FFF2-40B4-BE49-F238E27FC236}">
-                <a16:creationId xmlns:a16="http://schemas.microsoft.com/office/drawing/2014/main" id="{AB001B61-BED9-4047-9B8F-FF1E953C2A14}"/>
-              </a:ext>
-            </a:extLst>
-          </p:cNvPr>
-          <p:cNvSpPr/>
-          <p:nvPr/>
-        </p:nvSpPr>
-        <p:spPr>
-          <a:xfrm>
-            <a:off x="7536222" y="3545434"/>
-            <a:ext cx="1362075" cy="1038225"/>
-          </a:xfrm>
-          <a:prstGeom prst="ellipse">
-            <a:avLst/>
-          </a:prstGeom>
-          <a:solidFill>
-            <a:schemeClr val="bg1"/>
-          </a:solidFill>
-        </p:spPr>
-        <p:style>
-          <a:lnRef idx="2">
-            <a:schemeClr val="accent1">
-              <a:shade val="50000"/>
-            </a:schemeClr>
-          </a:lnRef>
-          <a:fillRef idx="1">
-            <a:schemeClr val="accent1"/>
-          </a:fillRef>
-          <a:effectRef idx="0">
-            <a:schemeClr val="accent1"/>
-          </a:effectRef>
-          <a:fontRef idx="minor">
-            <a:schemeClr val="lt1"/>
-          </a:fontRef>
-        </p:style>
-        <p:txBody>
-          <a:bodyPr rtlCol="0" anchor="ctr"/>
-          <a:lstStyle/>
-          <a:p>
-            <a:pPr marL="0" marR="0" algn="ctr">
-              <a:spcBef>
-                <a:spcPts val="0"/>
-              </a:spcBef>
-              <a:spcAft>
-                <a:spcPts val="0"/>
-              </a:spcAft>
-            </a:pPr>
-            <a:r>
-              <a:rPr lang="en-US" sz="1000" dirty="0">
-                <a:solidFill>
-                  <a:srgbClr val="000000"/>
-                </a:solidFill>
-                <a:effectLst/>
-                <a:ea typeface="Times New Roman" panose="02020603050405020304" pitchFamily="18" charset="0"/>
-              </a:rPr>
-              <a:t>6) Evaluate Pressure</a:t>
-            </a:r>
-            <a:endParaRPr lang="en-US" sz="1200" dirty="0">
-              <a:effectLst/>
-              <a:latin typeface="Times New Roman" panose="02020603050405020304" pitchFamily="18" charset="0"/>
-              <a:ea typeface="Times New Roman" panose="02020603050405020304" pitchFamily="18" charset="0"/>
-            </a:endParaRPr>
-          </a:p>
-          <a:p>
-            <a:pPr marL="0" marR="0" algn="ctr">
-              <a:spcBef>
-                <a:spcPts val="0"/>
-              </a:spcBef>
-              <a:spcAft>
-                <a:spcPts val="0"/>
-              </a:spcAft>
-            </a:pPr>
-            <a:r>
-              <a:rPr lang="en-US" sz="1000" dirty="0">
-                <a:solidFill>
-                  <a:srgbClr val="000000"/>
-                </a:solidFill>
-                <a:effectLst/>
-                <a:ea typeface="Times New Roman" panose="02020603050405020304" pitchFamily="18" charset="0"/>
-              </a:rPr>
-              <a:t>&amp; comparison</a:t>
-            </a:r>
-          </a:p>
-          <a:p>
-            <a:pPr marL="0" marR="0" algn="ctr">
-              <a:spcBef>
-                <a:spcPts val="0"/>
-              </a:spcBef>
-              <a:spcAft>
-                <a:spcPts val="0"/>
-              </a:spcAft>
-            </a:pPr>
-            <a:r>
-              <a:rPr lang="en-US" sz="1000" dirty="0">
-                <a:solidFill>
-                  <a:srgbClr val="7030A0"/>
-                </a:solidFill>
-                <a:latin typeface="Times New Roman" panose="02020603050405020304" pitchFamily="18" charset="0"/>
-                <a:ea typeface="Times New Roman" panose="02020603050405020304" pitchFamily="18" charset="0"/>
-              </a:rPr>
-              <a:t>-write into #m20</a:t>
-            </a:r>
-            <a:endParaRPr lang="en-US" sz="1200" dirty="0">
-              <a:solidFill>
-                <a:srgbClr val="7030A0"/>
-              </a:solidFill>
-              <a:effectLst/>
-              <a:latin typeface="Times New Roman" panose="02020603050405020304" pitchFamily="18" charset="0"/>
-              <a:ea typeface="Times New Roman" panose="02020603050405020304" pitchFamily="18" charset="0"/>
-            </a:endParaRPr>
-          </a:p>
-        </p:txBody>
-      </p:sp>
-      <p:sp>
-        <p:nvSpPr>
-          <p:cNvPr id="13" name="Oval 12">
-            <a:extLst>
-              <a:ext uri="{FF2B5EF4-FFF2-40B4-BE49-F238E27FC236}">
-                <a16:creationId xmlns:a16="http://schemas.microsoft.com/office/drawing/2014/main" id="{36EEC1F0-F701-4D77-A20F-5CBE4500D990}"/>
-              </a:ext>
-            </a:extLst>
-          </p:cNvPr>
-          <p:cNvSpPr/>
-          <p:nvPr/>
-        </p:nvSpPr>
-        <p:spPr>
-          <a:xfrm>
-            <a:off x="6295434" y="4413616"/>
-            <a:ext cx="1362075" cy="1038225"/>
-          </a:xfrm>
-          <a:prstGeom prst="ellipse">
-            <a:avLst/>
-          </a:prstGeom>
-          <a:solidFill>
-            <a:schemeClr val="bg1"/>
-          </a:solidFill>
-        </p:spPr>
-        <p:style>
-          <a:lnRef idx="2">
-            <a:schemeClr val="accent1">
-              <a:shade val="50000"/>
-            </a:schemeClr>
-          </a:lnRef>
-          <a:fillRef idx="1">
-            <a:schemeClr val="accent1"/>
-          </a:fillRef>
-          <a:effectRef idx="0">
-            <a:schemeClr val="accent1"/>
-          </a:effectRef>
-          <a:fontRef idx="minor">
-            <a:schemeClr val="lt1"/>
-          </a:fontRef>
-        </p:style>
-        <p:txBody>
-          <a:bodyPr rtlCol="0" anchor="ctr"/>
-          <a:lstStyle/>
-          <a:p>
-            <a:pPr marL="0" marR="0" algn="ctr">
-              <a:spcBef>
-                <a:spcPts val="0"/>
-              </a:spcBef>
-              <a:spcAft>
-                <a:spcPts val="0"/>
-              </a:spcAft>
-            </a:pPr>
-            <a:r>
-              <a:rPr lang="nb-NO" sz="1100" dirty="0">
-                <a:solidFill>
-                  <a:srgbClr val="000000"/>
-                </a:solidFill>
-                <a:effectLst/>
-                <a:ea typeface="Times New Roman" panose="02020603050405020304" pitchFamily="18" charset="0"/>
-                <a:cs typeface="Times New Roman" panose="02020603050405020304" pitchFamily="18" charset="0"/>
-              </a:rPr>
-              <a:t>5)Go to </a:t>
-            </a:r>
-            <a:r>
-              <a:rPr lang="nb-NO" sz="1100" dirty="0" err="1">
-                <a:solidFill>
-                  <a:srgbClr val="000000"/>
-                </a:solidFill>
-                <a:effectLst/>
-                <a:ea typeface="Times New Roman" panose="02020603050405020304" pitchFamily="18" charset="0"/>
-                <a:cs typeface="Times New Roman" panose="02020603050405020304" pitchFamily="18" charset="0"/>
-              </a:rPr>
-              <a:t>emergency</a:t>
-            </a:r>
-            <a:r>
-              <a:rPr lang="nb-NO" sz="1100" dirty="0">
-                <a:solidFill>
-                  <a:srgbClr val="000000"/>
-                </a:solidFill>
-                <a:effectLst/>
-                <a:ea typeface="Times New Roman" panose="02020603050405020304" pitchFamily="18" charset="0"/>
-                <a:cs typeface="Times New Roman" panose="02020603050405020304" pitchFamily="18" charset="0"/>
-              </a:rPr>
-              <a:t> </a:t>
-            </a:r>
-            <a:r>
-              <a:rPr lang="nb-NO" sz="1100" dirty="0" err="1">
-                <a:solidFill>
-                  <a:srgbClr val="000000"/>
-                </a:solidFill>
-                <a:effectLst/>
-                <a:ea typeface="Times New Roman" panose="02020603050405020304" pitchFamily="18" charset="0"/>
-                <a:cs typeface="Times New Roman" panose="02020603050405020304" pitchFamily="18" charset="0"/>
-              </a:rPr>
-              <a:t>flowrate</a:t>
-            </a:r>
-            <a:r>
-              <a:rPr lang="nb-NO" sz="1100" dirty="0">
-                <a:solidFill>
-                  <a:srgbClr val="000000"/>
-                </a:solidFill>
-                <a:effectLst/>
-                <a:ea typeface="Times New Roman" panose="02020603050405020304" pitchFamily="18" charset="0"/>
-                <a:cs typeface="Times New Roman" panose="02020603050405020304" pitchFamily="18" charset="0"/>
-              </a:rPr>
-              <a:t> </a:t>
-            </a:r>
-          </a:p>
-          <a:p>
-            <a:pPr marL="0" marR="0" algn="ctr">
-              <a:spcBef>
-                <a:spcPts val="0"/>
-              </a:spcBef>
-              <a:spcAft>
-                <a:spcPts val="0"/>
-              </a:spcAft>
-            </a:pPr>
-            <a:r>
-              <a:rPr lang="nb-NO" sz="1100" dirty="0">
-                <a:solidFill>
-                  <a:srgbClr val="7030A0"/>
-                </a:solidFill>
-                <a:latin typeface="Times New Roman" panose="02020603050405020304" pitchFamily="18" charset="0"/>
-                <a:ea typeface="Times New Roman" panose="02020603050405020304" pitchFamily="18" charset="0"/>
-                <a:cs typeface="Times New Roman" panose="02020603050405020304" pitchFamily="18" charset="0"/>
-              </a:rPr>
-              <a:t>-</a:t>
-            </a:r>
-            <a:r>
-              <a:rPr lang="nb-NO" sz="1100" dirty="0" err="1">
-                <a:solidFill>
-                  <a:srgbClr val="7030A0"/>
-                </a:solidFill>
-                <a:latin typeface="Times New Roman" panose="02020603050405020304" pitchFamily="18" charset="0"/>
-                <a:ea typeface="Times New Roman" panose="02020603050405020304" pitchFamily="18" charset="0"/>
-                <a:cs typeface="Times New Roman" panose="02020603050405020304" pitchFamily="18" charset="0"/>
-              </a:rPr>
-              <a:t>read</a:t>
-            </a:r>
-            <a:r>
-              <a:rPr lang="nb-NO" sz="1100" dirty="0">
-                <a:solidFill>
-                  <a:srgbClr val="7030A0"/>
-                </a:solidFill>
-                <a:latin typeface="Times New Roman" panose="02020603050405020304" pitchFamily="18" charset="0"/>
-                <a:ea typeface="Times New Roman" panose="02020603050405020304" pitchFamily="18" charset="0"/>
-                <a:cs typeface="Times New Roman" panose="02020603050405020304" pitchFamily="18" charset="0"/>
-              </a:rPr>
-              <a:t> #m10</a:t>
-            </a:r>
-            <a:endParaRPr lang="en-US" sz="1200" dirty="0">
-              <a:solidFill>
-                <a:srgbClr val="7030A0"/>
-              </a:solidFill>
-              <a:effectLst/>
-              <a:latin typeface="Times New Roman" panose="02020603050405020304" pitchFamily="18" charset="0"/>
-              <a:ea typeface="Times New Roman" panose="02020603050405020304" pitchFamily="18" charset="0"/>
-            </a:endParaRPr>
-          </a:p>
-        </p:txBody>
-      </p:sp>
-      <p:sp>
-        <p:nvSpPr>
-          <p:cNvPr id="14" name="Oval 13">
-            <a:extLst>
-              <a:ext uri="{FF2B5EF4-FFF2-40B4-BE49-F238E27FC236}">
-                <a16:creationId xmlns:a16="http://schemas.microsoft.com/office/drawing/2014/main" id="{B947FD99-A70B-4765-8B4D-76A1EC9EB852}"/>
-              </a:ext>
-            </a:extLst>
-          </p:cNvPr>
-          <p:cNvSpPr/>
-          <p:nvPr/>
-        </p:nvSpPr>
-        <p:spPr>
-          <a:xfrm>
-            <a:off x="9091519" y="4890137"/>
-            <a:ext cx="1371600" cy="1038225"/>
-          </a:xfrm>
-          <a:prstGeom prst="ellipse">
-            <a:avLst/>
-          </a:prstGeom>
-          <a:solidFill>
-            <a:schemeClr val="bg1"/>
-          </a:solidFill>
-        </p:spPr>
-        <p:style>
-          <a:lnRef idx="2">
-            <a:schemeClr val="accent1">
-              <a:shade val="50000"/>
-            </a:schemeClr>
-          </a:lnRef>
-          <a:fillRef idx="1">
-            <a:schemeClr val="accent1"/>
-          </a:fillRef>
-          <a:effectRef idx="0">
-            <a:schemeClr val="accent1"/>
-          </a:effectRef>
-          <a:fontRef idx="minor">
-            <a:schemeClr val="lt1"/>
-          </a:fontRef>
-        </p:style>
-        <p:txBody>
-          <a:bodyPr rtlCol="0" anchor="ctr"/>
-          <a:lstStyle/>
-          <a:p>
-            <a:pPr marL="0" marR="0">
-              <a:spcBef>
-                <a:spcPts val="0"/>
-              </a:spcBef>
-              <a:spcAft>
-                <a:spcPts val="0"/>
-              </a:spcAft>
-            </a:pPr>
-            <a:r>
-              <a:rPr lang="en-US" sz="1100" dirty="0">
-                <a:solidFill>
-                  <a:srgbClr val="000000"/>
-                </a:solidFill>
-                <a:effectLst/>
-                <a:ea typeface="Times New Roman" panose="02020603050405020304" pitchFamily="18" charset="0"/>
-                <a:cs typeface="Times New Roman" panose="02020603050405020304" pitchFamily="18" charset="0"/>
-              </a:rPr>
-              <a:t>7b) Stop pump </a:t>
-            </a:r>
-            <a:endParaRPr lang="en-US" sz="1200" dirty="0">
-              <a:effectLst/>
-              <a:latin typeface="Times New Roman" panose="02020603050405020304" pitchFamily="18" charset="0"/>
-              <a:ea typeface="Times New Roman" panose="02020603050405020304" pitchFamily="18" charset="0"/>
-            </a:endParaRPr>
-          </a:p>
-        </p:txBody>
-      </p:sp>
-      <p:sp>
-        <p:nvSpPr>
-          <p:cNvPr id="15" name="Oval 14">
-            <a:extLst>
-              <a:ext uri="{FF2B5EF4-FFF2-40B4-BE49-F238E27FC236}">
-                <a16:creationId xmlns:a16="http://schemas.microsoft.com/office/drawing/2014/main" id="{CECC68E6-22AE-43EE-90DF-CE8A270D9F6E}"/>
-              </a:ext>
-            </a:extLst>
-          </p:cNvPr>
-          <p:cNvSpPr/>
-          <p:nvPr/>
-        </p:nvSpPr>
-        <p:spPr>
-          <a:xfrm>
-            <a:off x="9548719" y="3242312"/>
-            <a:ext cx="1362075" cy="1038225"/>
-          </a:xfrm>
-          <a:prstGeom prst="ellipse">
-            <a:avLst/>
-          </a:prstGeom>
-          <a:solidFill>
-            <a:schemeClr val="bg1"/>
-          </a:solidFill>
-        </p:spPr>
-        <p:style>
-          <a:lnRef idx="2">
-            <a:schemeClr val="accent1">
-              <a:shade val="50000"/>
-            </a:schemeClr>
-          </a:lnRef>
-          <a:fillRef idx="1">
-            <a:schemeClr val="accent1"/>
-          </a:fillRef>
-          <a:effectRef idx="0">
-            <a:schemeClr val="accent1"/>
-          </a:effectRef>
-          <a:fontRef idx="minor">
-            <a:schemeClr val="lt1"/>
-          </a:fontRef>
-        </p:style>
-        <p:txBody>
-          <a:bodyPr rtlCol="0" anchor="ctr"/>
-          <a:lstStyle/>
-          <a:p>
-            <a:pPr marL="0" marR="0" algn="ctr">
-              <a:spcBef>
-                <a:spcPts val="0"/>
-              </a:spcBef>
-              <a:spcAft>
-                <a:spcPts val="0"/>
-              </a:spcAft>
-            </a:pPr>
-            <a:r>
-              <a:rPr lang="en-US" sz="1100" dirty="0">
-                <a:solidFill>
-                  <a:srgbClr val="000000"/>
-                </a:solidFill>
-                <a:effectLst/>
-                <a:ea typeface="Times New Roman" panose="02020603050405020304" pitchFamily="18" charset="0"/>
-                <a:cs typeface="Times New Roman" panose="02020603050405020304" pitchFamily="18" charset="0"/>
-              </a:rPr>
-              <a:t>7a) Go to safe flowrate</a:t>
-            </a:r>
-            <a:endParaRPr lang="en-US" sz="1200" dirty="0">
-              <a:effectLst/>
-              <a:latin typeface="Times New Roman" panose="02020603050405020304" pitchFamily="18" charset="0"/>
-              <a:ea typeface="Times New Roman" panose="02020603050405020304" pitchFamily="18" charset="0"/>
-            </a:endParaRPr>
-          </a:p>
-        </p:txBody>
-      </p:sp>
-      <p:cxnSp>
-        <p:nvCxnSpPr>
-          <p:cNvPr id="16" name="Connector: Curved 15">
-            <a:extLst>
-              <a:ext uri="{FF2B5EF4-FFF2-40B4-BE49-F238E27FC236}">
-                <a16:creationId xmlns:a16="http://schemas.microsoft.com/office/drawing/2014/main" id="{E21D163E-BBD9-432A-91BC-C98FDF45F4DC}"/>
-              </a:ext>
-            </a:extLst>
-          </p:cNvPr>
-          <p:cNvCxnSpPr/>
-          <p:nvPr/>
-        </p:nvCxnSpPr>
-        <p:spPr>
-          <a:xfrm flipH="1" flipV="1">
-            <a:off x="10282144" y="3166112"/>
-            <a:ext cx="676275" cy="523875"/>
-          </a:xfrm>
-          <a:prstGeom prst="curvedConnector4">
-            <a:avLst>
-              <a:gd name="adj1" fmla="val -35556"/>
-              <a:gd name="adj2" fmla="val 141739"/>
-            </a:avLst>
-          </a:prstGeom>
-          <a:ln>
-            <a:tailEnd type="triangle"/>
-          </a:ln>
-        </p:spPr>
-        <p:style>
-          <a:lnRef idx="1">
-            <a:schemeClr val="accent1"/>
-          </a:lnRef>
-          <a:fillRef idx="0">
-            <a:schemeClr val="accent1"/>
-          </a:fillRef>
-          <a:effectRef idx="0">
-            <a:schemeClr val="accent1"/>
-          </a:effectRef>
-          <a:fontRef idx="minor">
-            <a:schemeClr val="tx1"/>
-          </a:fontRef>
-        </p:style>
-      </p:cxnSp>
-      <p:cxnSp>
-        <p:nvCxnSpPr>
-          <p:cNvPr id="17" name="Connector: Curved 16">
-            <a:extLst>
-              <a:ext uri="{FF2B5EF4-FFF2-40B4-BE49-F238E27FC236}">
-                <a16:creationId xmlns:a16="http://schemas.microsoft.com/office/drawing/2014/main" id="{25878121-E3FE-44B6-9C8A-AFFB54AC2BCF}"/>
-              </a:ext>
-            </a:extLst>
-          </p:cNvPr>
-          <p:cNvCxnSpPr/>
-          <p:nvPr/>
-        </p:nvCxnSpPr>
-        <p:spPr>
-          <a:xfrm rot="16200000" flipH="1">
-            <a:off x="8956582" y="3875724"/>
-            <a:ext cx="330200" cy="1825625"/>
-          </a:xfrm>
-          <a:prstGeom prst="curvedConnector3">
-            <a:avLst>
-              <a:gd name="adj1" fmla="val 50000"/>
-            </a:avLst>
-          </a:prstGeom>
-          <a:ln>
-            <a:tailEnd type="triangle"/>
-          </a:ln>
-        </p:spPr>
-        <p:style>
-          <a:lnRef idx="1">
-            <a:schemeClr val="accent1"/>
-          </a:lnRef>
-          <a:fillRef idx="0">
-            <a:schemeClr val="accent1"/>
-          </a:fillRef>
-          <a:effectRef idx="0">
-            <a:schemeClr val="accent1"/>
-          </a:effectRef>
-          <a:fontRef idx="minor">
-            <a:schemeClr val="tx1"/>
-          </a:fontRef>
-        </p:style>
-      </p:cxnSp>
-      <p:cxnSp>
-        <p:nvCxnSpPr>
-          <p:cNvPr id="18" name="Connector: Curved 17">
-            <a:extLst>
-              <a:ext uri="{FF2B5EF4-FFF2-40B4-BE49-F238E27FC236}">
-                <a16:creationId xmlns:a16="http://schemas.microsoft.com/office/drawing/2014/main" id="{B4C962A5-6D66-48A2-85CF-0C7AA19FB6EA}"/>
-              </a:ext>
-            </a:extLst>
-          </p:cNvPr>
-          <p:cNvCxnSpPr/>
-          <p:nvPr/>
-        </p:nvCxnSpPr>
-        <p:spPr>
-          <a:xfrm rot="5400000" flipH="1" flipV="1">
-            <a:off x="9061674" y="3207387"/>
-            <a:ext cx="118110" cy="836930"/>
-          </a:xfrm>
-          <a:prstGeom prst="curvedConnector2">
-            <a:avLst/>
-          </a:prstGeom>
-          <a:ln>
-            <a:tailEnd type="triangle"/>
-          </a:ln>
-        </p:spPr>
-        <p:style>
-          <a:lnRef idx="1">
-            <a:schemeClr val="accent1"/>
-          </a:lnRef>
-          <a:fillRef idx="0">
-            <a:schemeClr val="accent1"/>
-          </a:fillRef>
-          <a:effectRef idx="0">
-            <a:schemeClr val="accent1"/>
-          </a:effectRef>
-          <a:fontRef idx="minor">
-            <a:schemeClr val="tx1"/>
-          </a:fontRef>
-        </p:style>
-      </p:cxnSp>
-      <p:cxnSp>
-        <p:nvCxnSpPr>
-          <p:cNvPr id="19" name="Connector: Curved 18">
-            <a:extLst>
-              <a:ext uri="{FF2B5EF4-FFF2-40B4-BE49-F238E27FC236}">
-                <a16:creationId xmlns:a16="http://schemas.microsoft.com/office/drawing/2014/main" id="{CBA7B1E0-7316-445C-95F9-03EB1BBB7AD8}"/>
-              </a:ext>
-            </a:extLst>
-          </p:cNvPr>
-          <p:cNvCxnSpPr>
-            <a:cxnSpLocks/>
-            <a:endCxn id="12" idx="4"/>
-          </p:cNvCxnSpPr>
-          <p:nvPr/>
-        </p:nvCxnSpPr>
-        <p:spPr>
-          <a:xfrm flipV="1">
-            <a:off x="7223259" y="4583659"/>
-            <a:ext cx="994001" cy="849268"/>
-          </a:xfrm>
-          <a:prstGeom prst="curvedConnector2">
-            <a:avLst/>
-          </a:prstGeom>
-          <a:ln>
-            <a:tailEnd type="triangle"/>
-          </a:ln>
-        </p:spPr>
-        <p:style>
-          <a:lnRef idx="1">
-            <a:schemeClr val="accent1"/>
-          </a:lnRef>
-          <a:fillRef idx="0">
-            <a:schemeClr val="accent1"/>
-          </a:fillRef>
-          <a:effectRef idx="0">
-            <a:schemeClr val="accent1"/>
-          </a:effectRef>
-          <a:fontRef idx="minor">
-            <a:schemeClr val="tx1"/>
-          </a:fontRef>
-        </p:style>
-      </p:cxnSp>
-      <p:sp>
-        <p:nvSpPr>
-          <p:cNvPr id="20" name="Rectangle 19">
-            <a:extLst>
-              <a:ext uri="{FF2B5EF4-FFF2-40B4-BE49-F238E27FC236}">
-                <a16:creationId xmlns:a16="http://schemas.microsoft.com/office/drawing/2014/main" id="{ABE175B7-3542-4F8F-BAEA-4245EBAB455F}"/>
-              </a:ext>
-            </a:extLst>
-          </p:cNvPr>
-          <p:cNvSpPr/>
-          <p:nvPr/>
-        </p:nvSpPr>
-        <p:spPr>
-          <a:xfrm>
-            <a:off x="6198641" y="1436914"/>
-            <a:ext cx="5791971" cy="4784272"/>
-          </a:xfrm>
-          <a:prstGeom prst="rect">
-            <a:avLst/>
-          </a:prstGeom>
-          <a:noFill/>
-        </p:spPr>
-        <p:style>
-          <a:lnRef idx="2">
-            <a:schemeClr val="accent1">
-              <a:shade val="50000"/>
-            </a:schemeClr>
-          </a:lnRef>
-          <a:fillRef idx="1">
-            <a:schemeClr val="accent1"/>
-          </a:fillRef>
-          <a:effectRef idx="0">
-            <a:schemeClr val="accent1"/>
-          </a:effectRef>
-          <a:fontRef idx="minor">
-            <a:schemeClr val="lt1"/>
-          </a:fontRef>
-        </p:style>
-        <p:txBody>
-          <a:bodyPr rtlCol="0" anchor="ctr"/>
-          <a:lstStyle/>
-          <a:p>
-            <a:pPr algn="ctr"/>
-            <a:endParaRPr lang="en-US" dirty="0"/>
-          </a:p>
-        </p:txBody>
-      </p:sp>
-      <p:cxnSp>
-        <p:nvCxnSpPr>
-          <p:cNvPr id="22" name="Connector: Curved 21">
-            <a:extLst>
-              <a:ext uri="{FF2B5EF4-FFF2-40B4-BE49-F238E27FC236}">
-                <a16:creationId xmlns:a16="http://schemas.microsoft.com/office/drawing/2014/main" id="{CC7C5287-9D75-4545-8911-D0FB444023F8}"/>
-              </a:ext>
-            </a:extLst>
-          </p:cNvPr>
-          <p:cNvCxnSpPr>
-            <a:cxnSpLocks/>
-            <a:stCxn id="11" idx="2"/>
-            <a:endCxn id="13" idx="2"/>
-          </p:cNvCxnSpPr>
-          <p:nvPr/>
-        </p:nvCxnSpPr>
-        <p:spPr>
-          <a:xfrm rot="5400000" flipH="1" flipV="1">
-            <a:off x="5773095" y="4552484"/>
-            <a:ext cx="142093" cy="902584"/>
-          </a:xfrm>
-          <a:prstGeom prst="curvedConnector4">
-            <a:avLst>
-              <a:gd name="adj1" fmla="val -160881"/>
-              <a:gd name="adj2" fmla="val 75535"/>
-            </a:avLst>
-          </a:prstGeom>
-          <a:ln>
-            <a:tailEnd type="triangle"/>
-          </a:ln>
-        </p:spPr>
-        <p:style>
-          <a:lnRef idx="1">
-            <a:schemeClr val="accent1"/>
-          </a:lnRef>
-          <a:fillRef idx="0">
-            <a:schemeClr val="accent1"/>
-          </a:fillRef>
-          <a:effectRef idx="0">
-            <a:schemeClr val="accent1"/>
-          </a:effectRef>
-          <a:fontRef idx="minor">
-            <a:schemeClr val="tx1"/>
-          </a:fontRef>
-        </p:style>
-      </p:cxnSp>
-      <p:sp>
-        <p:nvSpPr>
-          <p:cNvPr id="23" name="Rectangle 22">
-            <a:extLst>
-              <a:ext uri="{FF2B5EF4-FFF2-40B4-BE49-F238E27FC236}">
-                <a16:creationId xmlns:a16="http://schemas.microsoft.com/office/drawing/2014/main" id="{FA042A0C-4C20-43F2-9B30-3852143E5182}"/>
-              </a:ext>
-            </a:extLst>
-          </p:cNvPr>
-          <p:cNvSpPr/>
-          <p:nvPr/>
-        </p:nvSpPr>
-        <p:spPr>
-          <a:xfrm>
-            <a:off x="1848617" y="3644583"/>
-            <a:ext cx="1343615" cy="914400"/>
-          </a:xfrm>
-          <a:prstGeom prst="rect">
-            <a:avLst/>
-          </a:prstGeom>
-          <a:noFill/>
-          <a:ln>
-            <a:solidFill>
-              <a:schemeClr val="tx1"/>
-            </a:solidFill>
-          </a:ln>
-        </p:spPr>
-        <p:style>
-          <a:lnRef idx="2">
-            <a:schemeClr val="accent1">
-              <a:shade val="50000"/>
-            </a:schemeClr>
-          </a:lnRef>
-          <a:fillRef idx="1">
-            <a:schemeClr val="accent1"/>
-          </a:fillRef>
-          <a:effectRef idx="0">
-            <a:schemeClr val="accent1"/>
-          </a:effectRef>
-          <a:fontRef idx="minor">
-            <a:schemeClr val="lt1"/>
-          </a:fontRef>
-        </p:style>
-        <p:txBody>
-          <a:bodyPr rtlCol="0" anchor="ctr"/>
-          <a:lstStyle/>
-          <a:p>
-            <a:pPr algn="ctr"/>
-            <a:r>
-              <a:rPr lang="en-US" sz="1200" dirty="0">
-                <a:solidFill>
-                  <a:schemeClr val="tx1"/>
-                </a:solidFill>
-              </a:rPr>
-              <a:t>3)Reduce misfit by using Kalman Filter algorithm</a:t>
-            </a:r>
-          </a:p>
-          <a:p>
-            <a:pPr algn="ctr"/>
-            <a:r>
-              <a:rPr lang="en-US" sz="1200" dirty="0">
-                <a:solidFill>
-                  <a:srgbClr val="7030A0"/>
-                </a:solidFill>
-              </a:rPr>
-              <a:t>-Read #m6&amp;m5</a:t>
-            </a:r>
-          </a:p>
-        </p:txBody>
-      </p:sp>
-      <p:cxnSp>
-        <p:nvCxnSpPr>
-          <p:cNvPr id="25" name="Connector: Curved 24">
-            <a:extLst>
-              <a:ext uri="{FF2B5EF4-FFF2-40B4-BE49-F238E27FC236}">
-                <a16:creationId xmlns:a16="http://schemas.microsoft.com/office/drawing/2014/main" id="{AFEAB0FD-C879-4387-A28C-216A30775F9D}"/>
-              </a:ext>
-            </a:extLst>
-          </p:cNvPr>
-          <p:cNvCxnSpPr>
-            <a:cxnSpLocks/>
-          </p:cNvCxnSpPr>
-          <p:nvPr/>
-        </p:nvCxnSpPr>
-        <p:spPr>
-          <a:xfrm>
-            <a:off x="3229745" y="4101783"/>
-            <a:ext cx="1692638" cy="515839"/>
-          </a:xfrm>
-          <a:prstGeom prst="curvedConnector3">
-            <a:avLst/>
-          </a:prstGeom>
-          <a:ln>
-            <a:tailEnd type="triangle"/>
-          </a:ln>
-        </p:spPr>
-        <p:style>
-          <a:lnRef idx="1">
-            <a:schemeClr val="accent1"/>
-          </a:lnRef>
-          <a:fillRef idx="0">
-            <a:schemeClr val="accent1"/>
-          </a:fillRef>
-          <a:effectRef idx="0">
-            <a:schemeClr val="accent1"/>
-          </a:effectRef>
-          <a:fontRef idx="minor">
-            <a:schemeClr val="tx1"/>
-          </a:fontRef>
-        </p:style>
-      </p:cxnSp>
-      <p:cxnSp>
-        <p:nvCxnSpPr>
-          <p:cNvPr id="27" name="Connector: Curved 26">
-            <a:extLst>
-              <a:ext uri="{FF2B5EF4-FFF2-40B4-BE49-F238E27FC236}">
-                <a16:creationId xmlns:a16="http://schemas.microsoft.com/office/drawing/2014/main" id="{4C6D3047-7601-40E8-939B-E57579190C63}"/>
-              </a:ext>
-            </a:extLst>
-          </p:cNvPr>
-          <p:cNvCxnSpPr>
-            <a:cxnSpLocks/>
-            <a:endCxn id="7" idx="3"/>
-          </p:cNvCxnSpPr>
-          <p:nvPr/>
-        </p:nvCxnSpPr>
-        <p:spPr>
-          <a:xfrm rot="10800000" flipV="1">
-            <a:off x="3658383" y="4901019"/>
-            <a:ext cx="1252820" cy="549564"/>
-          </a:xfrm>
-          <a:prstGeom prst="curvedConnector3">
-            <a:avLst/>
-          </a:prstGeom>
-          <a:ln>
-            <a:tailEnd type="triangle"/>
-          </a:ln>
-        </p:spPr>
-        <p:style>
-          <a:lnRef idx="1">
-            <a:schemeClr val="accent1"/>
-          </a:lnRef>
-          <a:fillRef idx="0">
-            <a:schemeClr val="accent1"/>
-          </a:fillRef>
-          <a:effectRef idx="0">
-            <a:schemeClr val="accent1"/>
-          </a:effectRef>
-          <a:fontRef idx="minor">
-            <a:schemeClr val="tx1"/>
-          </a:fontRef>
-        </p:style>
-      </p:cxnSp>
-      <p:cxnSp>
-        <p:nvCxnSpPr>
-          <p:cNvPr id="29" name="Straight Arrow Connector 28">
-            <a:extLst>
-              <a:ext uri="{FF2B5EF4-FFF2-40B4-BE49-F238E27FC236}">
-                <a16:creationId xmlns:a16="http://schemas.microsoft.com/office/drawing/2014/main" id="{C5A3762B-4B88-415E-8E8E-BA3EA7B7AAAE}"/>
-              </a:ext>
-            </a:extLst>
-          </p:cNvPr>
-          <p:cNvCxnSpPr>
-            <a:cxnSpLocks/>
-            <a:stCxn id="7" idx="0"/>
-          </p:cNvCxnSpPr>
-          <p:nvPr/>
-        </p:nvCxnSpPr>
-        <p:spPr>
-          <a:xfrm flipV="1">
-            <a:off x="2919901" y="4583659"/>
-            <a:ext cx="0" cy="409724"/>
-          </a:xfrm>
-          <a:prstGeom prst="straightConnector1">
-            <a:avLst/>
-          </a:prstGeom>
-          <a:ln>
-            <a:tailEnd type="triangle"/>
-          </a:ln>
-        </p:spPr>
-        <p:style>
-          <a:lnRef idx="1">
-            <a:schemeClr val="accent1"/>
-          </a:lnRef>
-          <a:fillRef idx="0">
-            <a:schemeClr val="accent1"/>
-          </a:fillRef>
-          <a:effectRef idx="0">
-            <a:schemeClr val="accent1"/>
-          </a:effectRef>
-          <a:fontRef idx="minor">
-            <a:schemeClr val="tx1"/>
-          </a:fontRef>
-        </p:style>
-      </p:cxnSp>
-      <p:cxnSp>
-        <p:nvCxnSpPr>
-          <p:cNvPr id="32" name="Straight Arrow Connector 31">
-            <a:extLst>
-              <a:ext uri="{FF2B5EF4-FFF2-40B4-BE49-F238E27FC236}">
-                <a16:creationId xmlns:a16="http://schemas.microsoft.com/office/drawing/2014/main" id="{2247DA79-7DC4-43DF-B80D-7631DB4E1549}"/>
-              </a:ext>
-            </a:extLst>
-          </p:cNvPr>
-          <p:cNvCxnSpPr>
-            <a:cxnSpLocks/>
-          </p:cNvCxnSpPr>
-          <p:nvPr/>
-        </p:nvCxnSpPr>
-        <p:spPr>
-          <a:xfrm>
-            <a:off x="2562993" y="3189982"/>
-            <a:ext cx="1" cy="475606"/>
-          </a:xfrm>
-          <a:prstGeom prst="straightConnector1">
-            <a:avLst/>
-          </a:prstGeom>
-          <a:ln>
-            <a:tailEnd type="triangle"/>
-          </a:ln>
-        </p:spPr>
-        <p:style>
-          <a:lnRef idx="1">
-            <a:schemeClr val="accent1"/>
-          </a:lnRef>
-          <a:fillRef idx="0">
-            <a:schemeClr val="accent1"/>
-          </a:fillRef>
-          <a:effectRef idx="0">
-            <a:schemeClr val="accent1"/>
-          </a:effectRef>
-          <a:fontRef idx="minor">
-            <a:schemeClr val="tx1"/>
-          </a:fontRef>
-        </p:style>
-      </p:cxnSp>
-      <p:sp>
-        <p:nvSpPr>
-          <p:cNvPr id="38" name="Rectangle 37">
-            <a:extLst>
-              <a:ext uri="{FF2B5EF4-FFF2-40B4-BE49-F238E27FC236}">
-                <a16:creationId xmlns:a16="http://schemas.microsoft.com/office/drawing/2014/main" id="{51D32BB4-2377-4350-A75D-304CF48A26BC}"/>
-              </a:ext>
-            </a:extLst>
-          </p:cNvPr>
-          <p:cNvSpPr/>
-          <p:nvPr/>
-        </p:nvSpPr>
-        <p:spPr>
-          <a:xfrm>
-            <a:off x="1445811" y="1436914"/>
-            <a:ext cx="4554472" cy="4813096"/>
-          </a:xfrm>
-          <a:prstGeom prst="rect">
-            <a:avLst/>
-          </a:prstGeom>
-          <a:noFill/>
-          <a:ln>
-            <a:solidFill>
-              <a:schemeClr val="tx1"/>
-            </a:solidFill>
-            <a:prstDash val="solid"/>
-          </a:ln>
-        </p:spPr>
-        <p:style>
-          <a:lnRef idx="2">
-            <a:schemeClr val="accent1">
-              <a:shade val="50000"/>
-            </a:schemeClr>
-          </a:lnRef>
-          <a:fillRef idx="1">
-            <a:schemeClr val="accent1"/>
-          </a:fillRef>
-          <a:effectRef idx="0">
-            <a:schemeClr val="accent1"/>
-          </a:effectRef>
-          <a:fontRef idx="minor">
-            <a:schemeClr val="lt1"/>
-          </a:fontRef>
-        </p:style>
-        <p:txBody>
-          <a:bodyPr rtlCol="0" anchor="ctr"/>
-          <a:lstStyle/>
-          <a:p>
-            <a:pPr algn="ctr"/>
-            <a:endParaRPr lang="en-US" dirty="0"/>
-          </a:p>
-        </p:txBody>
-      </p:sp>
-      <p:cxnSp>
-        <p:nvCxnSpPr>
-          <p:cNvPr id="45" name="Straight Arrow Connector 44">
-            <a:extLst>
-              <a:ext uri="{FF2B5EF4-FFF2-40B4-BE49-F238E27FC236}">
-                <a16:creationId xmlns:a16="http://schemas.microsoft.com/office/drawing/2014/main" id="{4B4D2C2A-D56F-4232-BDDA-706D3445FA3A}"/>
-              </a:ext>
-            </a:extLst>
-          </p:cNvPr>
-          <p:cNvCxnSpPr>
-            <a:cxnSpLocks/>
-            <a:endCxn id="11" idx="0"/>
-          </p:cNvCxnSpPr>
-          <p:nvPr/>
-        </p:nvCxnSpPr>
-        <p:spPr>
-          <a:xfrm>
-            <a:off x="5392849" y="3566797"/>
-            <a:ext cx="1" cy="588824"/>
-          </a:xfrm>
-          <a:prstGeom prst="straightConnector1">
-            <a:avLst/>
-          </a:prstGeom>
-          <a:ln>
-            <a:tailEnd type="triangle"/>
-          </a:ln>
-        </p:spPr>
-        <p:style>
-          <a:lnRef idx="1">
-            <a:schemeClr val="accent1"/>
-          </a:lnRef>
-          <a:fillRef idx="0">
-            <a:schemeClr val="accent1"/>
-          </a:fillRef>
-          <a:effectRef idx="0">
-            <a:schemeClr val="accent1"/>
-          </a:effectRef>
-          <a:fontRef idx="minor">
-            <a:schemeClr val="tx1"/>
-          </a:fontRef>
-        </p:style>
-      </p:cxnSp>
-      <p:sp>
-        <p:nvSpPr>
-          <p:cNvPr id="47" name="Rectangle 46">
-            <a:extLst>
-              <a:ext uri="{FF2B5EF4-FFF2-40B4-BE49-F238E27FC236}">
-                <a16:creationId xmlns:a16="http://schemas.microsoft.com/office/drawing/2014/main" id="{C648F446-DBE3-4D3F-8DA2-35EABD33D209}"/>
-              </a:ext>
-            </a:extLst>
-          </p:cNvPr>
-          <p:cNvSpPr/>
-          <p:nvPr/>
-        </p:nvSpPr>
-        <p:spPr>
-          <a:xfrm>
-            <a:off x="6297669" y="1536221"/>
-            <a:ext cx="3980679" cy="612321"/>
-          </a:xfrm>
-          <a:prstGeom prst="rect">
-            <a:avLst/>
-          </a:prstGeom>
-        </p:spPr>
-        <p:style>
-          <a:lnRef idx="2">
-            <a:schemeClr val="accent1">
-              <a:shade val="50000"/>
-            </a:schemeClr>
-          </a:lnRef>
-          <a:fillRef idx="1">
-            <a:schemeClr val="accent1"/>
-          </a:fillRef>
-          <a:effectRef idx="0">
-            <a:schemeClr val="accent1"/>
-          </a:effectRef>
-          <a:fontRef idx="minor">
-            <a:schemeClr val="lt1"/>
-          </a:fontRef>
-        </p:style>
-        <p:txBody>
-          <a:bodyPr rtlCol="0" anchor="ctr"/>
-          <a:lstStyle/>
-          <a:p>
-            <a:pPr algn="ctr"/>
-            <a:r>
-              <a:rPr lang="en-US" dirty="0"/>
-              <a:t>Task 3: making decision</a:t>
-            </a:r>
-          </a:p>
-          <a:p>
-            <a:pPr algn="ctr"/>
-            <a:r>
-              <a:rPr lang="en-US" dirty="0"/>
-              <a:t>Read into #m10 &amp; write into #m20</a:t>
-            </a:r>
-          </a:p>
-        </p:txBody>
-      </p:sp>
-      <p:sp>
-        <p:nvSpPr>
-          <p:cNvPr id="48" name="Rectangle 47">
-            <a:extLst>
-              <a:ext uri="{FF2B5EF4-FFF2-40B4-BE49-F238E27FC236}">
-                <a16:creationId xmlns:a16="http://schemas.microsoft.com/office/drawing/2014/main" id="{5DE40CCF-AF7D-4C66-9669-624A096AA088}"/>
-              </a:ext>
-            </a:extLst>
-          </p:cNvPr>
-          <p:cNvSpPr/>
-          <p:nvPr/>
-        </p:nvSpPr>
-        <p:spPr>
-          <a:xfrm>
-            <a:off x="1472919" y="1534217"/>
-            <a:ext cx="4120539" cy="493837"/>
-          </a:xfrm>
-          <a:prstGeom prst="rect">
-            <a:avLst/>
-          </a:prstGeom>
-        </p:spPr>
-        <p:style>
-          <a:lnRef idx="2">
-            <a:schemeClr val="accent1">
-              <a:shade val="50000"/>
-            </a:schemeClr>
-          </a:lnRef>
-          <a:fillRef idx="1">
-            <a:schemeClr val="accent1"/>
-          </a:fillRef>
-          <a:effectRef idx="0">
-            <a:schemeClr val="accent1"/>
-          </a:effectRef>
-          <a:fontRef idx="minor">
-            <a:schemeClr val="lt1"/>
-          </a:fontRef>
-        </p:style>
-        <p:txBody>
-          <a:bodyPr rtlCol="0" anchor="ctr"/>
-          <a:lstStyle/>
-          <a:p>
-            <a:pPr algn="ctr"/>
-            <a:r>
-              <a:rPr lang="en-US" dirty="0"/>
-              <a:t>Task 1: updating pressure, write into #m10</a:t>
-            </a:r>
-          </a:p>
-        </p:txBody>
-      </p:sp>
-      <p:sp>
-        <p:nvSpPr>
-          <p:cNvPr id="49" name="Rectangle 48">
-            <a:extLst>
-              <a:ext uri="{FF2B5EF4-FFF2-40B4-BE49-F238E27FC236}">
-                <a16:creationId xmlns:a16="http://schemas.microsoft.com/office/drawing/2014/main" id="{A4D5B423-D3FB-4E71-8C7B-B2FA55A09C7D}"/>
-              </a:ext>
-            </a:extLst>
-          </p:cNvPr>
-          <p:cNvSpPr/>
-          <p:nvPr/>
-        </p:nvSpPr>
-        <p:spPr>
-          <a:xfrm>
-            <a:off x="723602" y="5630562"/>
-            <a:ext cx="1674357" cy="845411"/>
-          </a:xfrm>
-          <a:prstGeom prst="rect">
-            <a:avLst/>
-          </a:prstGeom>
-          <a:solidFill>
-            <a:srgbClr val="FFC000"/>
-          </a:solidFill>
-          <a:ln w="19050">
-            <a:solidFill>
-              <a:srgbClr val="FF0000"/>
-            </a:solidFill>
-            <a:prstDash val="sysDot"/>
-          </a:ln>
-        </p:spPr>
-        <p:style>
-          <a:lnRef idx="2">
-            <a:schemeClr val="accent1">
-              <a:shade val="50000"/>
-            </a:schemeClr>
-          </a:lnRef>
-          <a:fillRef idx="1">
-            <a:schemeClr val="accent1"/>
-          </a:fillRef>
-          <a:effectRef idx="0">
-            <a:schemeClr val="accent1"/>
-          </a:effectRef>
-          <a:fontRef idx="minor">
-            <a:schemeClr val="lt1"/>
-          </a:fontRef>
-        </p:style>
-        <p:txBody>
-          <a:bodyPr rtlCol="0" anchor="ctr"/>
-          <a:lstStyle/>
-          <a:p>
-            <a:pPr algn="ctr"/>
-            <a:r>
-              <a:rPr lang="en-US" sz="1400" dirty="0">
-                <a:solidFill>
-                  <a:schemeClr val="tx1"/>
-                </a:solidFill>
-              </a:rPr>
-              <a:t>Event: 1)Calculated flow rate by </a:t>
-            </a:r>
-            <a:r>
-              <a:rPr lang="en-US" sz="1400" b="1" u="sng" dirty="0">
-                <a:solidFill>
-                  <a:schemeClr val="tx1"/>
-                </a:solidFill>
-              </a:rPr>
-              <a:t>task 2</a:t>
-            </a:r>
-          </a:p>
-          <a:p>
-            <a:pPr algn="ctr"/>
-            <a:r>
-              <a:rPr lang="en-US" sz="1400" dirty="0">
-                <a:solidFill>
-                  <a:schemeClr val="tx1"/>
-                </a:solidFill>
-              </a:rPr>
-              <a:t>-</a:t>
-            </a:r>
-            <a:r>
-              <a:rPr lang="en-US" sz="1400" dirty="0">
-                <a:solidFill>
-                  <a:srgbClr val="7030A0"/>
-                </a:solidFill>
-              </a:rPr>
-              <a:t>write into #m6 </a:t>
-            </a:r>
-          </a:p>
-          <a:p>
-            <a:pPr algn="ctr"/>
-            <a:endParaRPr lang="en-US" sz="1400" b="1" u="sng" dirty="0">
-              <a:solidFill>
-                <a:schemeClr val="tx1"/>
-              </a:solidFill>
-            </a:endParaRPr>
-          </a:p>
-        </p:txBody>
-      </p:sp>
-      <p:cxnSp>
-        <p:nvCxnSpPr>
-          <p:cNvPr id="56" name="Straight Arrow Connector 55">
-            <a:extLst>
-              <a:ext uri="{FF2B5EF4-FFF2-40B4-BE49-F238E27FC236}">
-                <a16:creationId xmlns:a16="http://schemas.microsoft.com/office/drawing/2014/main" id="{2BD13AED-991A-4155-BFA0-48B2DF34DBFD}"/>
-              </a:ext>
-            </a:extLst>
-          </p:cNvPr>
-          <p:cNvCxnSpPr>
-            <a:cxnSpLocks/>
-            <a:stCxn id="4" idx="1"/>
-          </p:cNvCxnSpPr>
-          <p:nvPr/>
-        </p:nvCxnSpPr>
-        <p:spPr>
-          <a:xfrm flipH="1">
-            <a:off x="755560" y="2831991"/>
-            <a:ext cx="1093058" cy="309628"/>
-          </a:xfrm>
-          <a:prstGeom prst="straightConnector1">
-            <a:avLst/>
-          </a:prstGeom>
-          <a:ln>
-            <a:tailEnd type="triangle"/>
-          </a:ln>
-        </p:spPr>
-        <p:style>
-          <a:lnRef idx="1">
-            <a:schemeClr val="accent1"/>
-          </a:lnRef>
-          <a:fillRef idx="0">
-            <a:schemeClr val="accent1"/>
-          </a:fillRef>
-          <a:effectRef idx="0">
-            <a:schemeClr val="accent1"/>
-          </a:effectRef>
-          <a:fontRef idx="minor">
-            <a:schemeClr val="tx1"/>
-          </a:fontRef>
-        </p:style>
-      </p:cxnSp>
-      <p:sp>
-        <p:nvSpPr>
-          <p:cNvPr id="57" name="Flowchart: Decision 56">
-            <a:extLst>
-              <a:ext uri="{FF2B5EF4-FFF2-40B4-BE49-F238E27FC236}">
-                <a16:creationId xmlns:a16="http://schemas.microsoft.com/office/drawing/2014/main" id="{B15CD88B-1325-4BDC-9829-DEF12BA6EC6D}"/>
-              </a:ext>
-            </a:extLst>
-          </p:cNvPr>
-          <p:cNvSpPr/>
-          <p:nvPr/>
-        </p:nvSpPr>
-        <p:spPr>
-          <a:xfrm>
-            <a:off x="38201" y="3141619"/>
-            <a:ext cx="1434718" cy="776662"/>
-          </a:xfrm>
-          <a:prstGeom prst="flowChartDecision">
-            <a:avLst/>
-          </a:prstGeom>
-        </p:spPr>
-        <p:style>
-          <a:lnRef idx="2">
-            <a:schemeClr val="accent1">
-              <a:shade val="50000"/>
-            </a:schemeClr>
-          </a:lnRef>
-          <a:fillRef idx="1">
-            <a:schemeClr val="accent1"/>
-          </a:fillRef>
-          <a:effectRef idx="0">
-            <a:schemeClr val="accent1"/>
-          </a:effectRef>
-          <a:fontRef idx="minor">
-            <a:schemeClr val="lt1"/>
-          </a:fontRef>
-        </p:style>
-        <p:txBody>
-          <a:bodyPr rtlCol="0" anchor="ctr"/>
-          <a:lstStyle/>
-          <a:p>
-            <a:pPr algn="ctr"/>
-            <a:r>
-              <a:rPr lang="en-US" sz="1200" dirty="0">
-                <a:solidFill>
-                  <a:schemeClr val="tx1"/>
-                </a:solidFill>
-              </a:rPr>
-              <a:t>If ST or TR(event)</a:t>
-            </a:r>
-          </a:p>
-        </p:txBody>
-      </p:sp>
-      <p:cxnSp>
-        <p:nvCxnSpPr>
-          <p:cNvPr id="61" name="Straight Arrow Connector 60">
-            <a:extLst>
-              <a:ext uri="{FF2B5EF4-FFF2-40B4-BE49-F238E27FC236}">
-                <a16:creationId xmlns:a16="http://schemas.microsoft.com/office/drawing/2014/main" id="{DF533594-C9B5-488E-BC3A-E26192FCB2B2}"/>
-              </a:ext>
-            </a:extLst>
-          </p:cNvPr>
-          <p:cNvCxnSpPr>
-            <a:cxnSpLocks/>
-            <a:stCxn id="57" idx="2"/>
-          </p:cNvCxnSpPr>
-          <p:nvPr/>
-        </p:nvCxnSpPr>
-        <p:spPr>
-          <a:xfrm>
-            <a:off x="755560" y="3918281"/>
-            <a:ext cx="109757" cy="1636927"/>
-          </a:xfrm>
-          <a:prstGeom prst="straightConnector1">
-            <a:avLst/>
-          </a:prstGeom>
-          <a:ln>
-            <a:tailEnd type="triangle"/>
-          </a:ln>
-        </p:spPr>
-        <p:style>
-          <a:lnRef idx="1">
-            <a:schemeClr val="accent1"/>
-          </a:lnRef>
-          <a:fillRef idx="0">
-            <a:schemeClr val="accent1"/>
-          </a:fillRef>
-          <a:effectRef idx="0">
-            <a:schemeClr val="accent1"/>
-          </a:effectRef>
-          <a:fontRef idx="minor">
-            <a:schemeClr val="tx1"/>
-          </a:fontRef>
-        </p:style>
-      </p:cxnSp>
-      <p:cxnSp>
-        <p:nvCxnSpPr>
-          <p:cNvPr id="63" name="Straight Arrow Connector 62">
-            <a:extLst>
-              <a:ext uri="{FF2B5EF4-FFF2-40B4-BE49-F238E27FC236}">
-                <a16:creationId xmlns:a16="http://schemas.microsoft.com/office/drawing/2014/main" id="{5C04438C-73BD-478E-B11E-FDDA90FD13C7}"/>
-              </a:ext>
-            </a:extLst>
-          </p:cNvPr>
-          <p:cNvCxnSpPr>
-            <a:cxnSpLocks/>
-          </p:cNvCxnSpPr>
-          <p:nvPr/>
-        </p:nvCxnSpPr>
-        <p:spPr>
-          <a:xfrm>
-            <a:off x="1449171" y="3537630"/>
-            <a:ext cx="740217" cy="1785370"/>
-          </a:xfrm>
-          <a:prstGeom prst="straightConnector1">
-            <a:avLst/>
-          </a:prstGeom>
-          <a:ln>
-            <a:tailEnd type="triangle"/>
-          </a:ln>
-        </p:spPr>
-        <p:style>
-          <a:lnRef idx="1">
-            <a:schemeClr val="accent1"/>
-          </a:lnRef>
-          <a:fillRef idx="0">
-            <a:schemeClr val="accent1"/>
-          </a:fillRef>
-          <a:effectRef idx="0">
-            <a:schemeClr val="accent1"/>
-          </a:effectRef>
-          <a:fontRef idx="minor">
-            <a:schemeClr val="tx1"/>
-          </a:fontRef>
-        </p:style>
-      </p:cxnSp>
-      <p:sp>
-        <p:nvSpPr>
-          <p:cNvPr id="74" name="Rectangle 73">
-            <a:extLst>
-              <a:ext uri="{FF2B5EF4-FFF2-40B4-BE49-F238E27FC236}">
-                <a16:creationId xmlns:a16="http://schemas.microsoft.com/office/drawing/2014/main" id="{A80DC691-69AA-4F73-A40A-8937166E2CC9}"/>
-              </a:ext>
-            </a:extLst>
-          </p:cNvPr>
-          <p:cNvSpPr/>
-          <p:nvPr/>
-        </p:nvSpPr>
-        <p:spPr>
-          <a:xfrm>
-            <a:off x="315725" y="4108189"/>
-            <a:ext cx="1060683" cy="503026"/>
-          </a:xfrm>
-          <a:prstGeom prst="rect">
-            <a:avLst/>
-          </a:prstGeom>
-          <a:noFill/>
-          <a:ln>
-            <a:noFill/>
-          </a:ln>
-        </p:spPr>
-        <p:style>
-          <a:lnRef idx="2">
-            <a:schemeClr val="accent1">
-              <a:shade val="50000"/>
-            </a:schemeClr>
-          </a:lnRef>
-          <a:fillRef idx="1">
-            <a:schemeClr val="accent1"/>
-          </a:fillRef>
-          <a:effectRef idx="0">
-            <a:schemeClr val="accent1"/>
-          </a:effectRef>
-          <a:fontRef idx="minor">
-            <a:schemeClr val="lt1"/>
-          </a:fontRef>
-        </p:style>
-        <p:txBody>
-          <a:bodyPr rtlCol="0" anchor="ctr"/>
-          <a:lstStyle/>
-          <a:p>
-            <a:pPr algn="ctr"/>
-            <a:r>
-              <a:rPr lang="en-US" sz="1200" dirty="0">
-                <a:solidFill>
-                  <a:schemeClr val="tx1"/>
-                </a:solidFill>
-              </a:rPr>
-              <a:t>Transient event</a:t>
-            </a:r>
-          </a:p>
-        </p:txBody>
-      </p:sp>
-      <p:sp>
-        <p:nvSpPr>
-          <p:cNvPr id="75" name="Rectangle 74">
-            <a:extLst>
-              <a:ext uri="{FF2B5EF4-FFF2-40B4-BE49-F238E27FC236}">
-                <a16:creationId xmlns:a16="http://schemas.microsoft.com/office/drawing/2014/main" id="{2767C214-82E2-4037-BC69-B2CEBA087C8F}"/>
-              </a:ext>
-            </a:extLst>
-          </p:cNvPr>
-          <p:cNvSpPr/>
-          <p:nvPr/>
-        </p:nvSpPr>
-        <p:spPr>
-          <a:xfrm>
-            <a:off x="1148425" y="3460142"/>
-            <a:ext cx="624596" cy="1030893"/>
-          </a:xfrm>
-          <a:prstGeom prst="rect">
-            <a:avLst/>
-          </a:prstGeom>
-          <a:noFill/>
-          <a:ln>
-            <a:noFill/>
-          </a:ln>
-        </p:spPr>
-        <p:style>
-          <a:lnRef idx="2">
-            <a:schemeClr val="accent1">
-              <a:shade val="50000"/>
-            </a:schemeClr>
-          </a:lnRef>
-          <a:fillRef idx="1">
-            <a:schemeClr val="accent1"/>
-          </a:fillRef>
-          <a:effectRef idx="0">
-            <a:schemeClr val="accent1"/>
-          </a:effectRef>
-          <a:fontRef idx="minor">
-            <a:schemeClr val="lt1"/>
-          </a:fontRef>
-        </p:style>
-        <p:txBody>
-          <a:bodyPr rtlCol="0" anchor="ctr"/>
-          <a:lstStyle/>
-          <a:p>
-            <a:pPr algn="ctr"/>
-            <a:r>
-              <a:rPr lang="en-US" sz="1200" dirty="0">
-                <a:solidFill>
-                  <a:schemeClr val="tx1"/>
-                </a:solidFill>
-              </a:rPr>
-              <a:t>Steady state condition</a:t>
-            </a:r>
-          </a:p>
-        </p:txBody>
-      </p:sp>
-    </p:spTree>
-    <p:extLst>
-      <p:ext uri="{BB962C8B-B14F-4D97-AF65-F5344CB8AC3E}">
-        <p14:creationId xmlns:p14="http://schemas.microsoft.com/office/powerpoint/2010/main" val="3815582712"/>
       </p:ext>
     </p:extLst>
   </p:cSld>

</xml_diff>